<commit_message>
Transfer learning and price caps are added
</commit_message>
<xml_diff>
--- a/Term_Project_Presentation_Phase2_Ahmet_Yüksel_2234078.pptx
+++ b/Term_Project_Presentation_Phase2_Ahmet_Yüksel_2234078.pptx
@@ -281,7 +281,7 @@
           <a:p>
             <a:fld id="{2F649C15-FD6D-3747-B6D3-EFDE118C1E97}" type="datetimeFigureOut">
               <a:rPr lang="en-TR" smtClean="0"/>
-              <a:t>24.04.2024</a:t>
+              <a:t>27.04.2024</a:t>
             </a:fld>
             <a:endParaRPr lang="en-TR"/>
           </a:p>
@@ -481,7 +481,7 @@
           <a:p>
             <a:fld id="{2F649C15-FD6D-3747-B6D3-EFDE118C1E97}" type="datetimeFigureOut">
               <a:rPr lang="en-TR" smtClean="0"/>
-              <a:t>24.04.2024</a:t>
+              <a:t>27.04.2024</a:t>
             </a:fld>
             <a:endParaRPr lang="en-TR"/>
           </a:p>
@@ -691,7 +691,7 @@
           <a:p>
             <a:fld id="{2F649C15-FD6D-3747-B6D3-EFDE118C1E97}" type="datetimeFigureOut">
               <a:rPr lang="en-TR" smtClean="0"/>
-              <a:t>24.04.2024</a:t>
+              <a:t>27.04.2024</a:t>
             </a:fld>
             <a:endParaRPr lang="en-TR"/>
           </a:p>
@@ -891,7 +891,7 @@
           <a:p>
             <a:fld id="{2F649C15-FD6D-3747-B6D3-EFDE118C1E97}" type="datetimeFigureOut">
               <a:rPr lang="en-TR" smtClean="0"/>
-              <a:t>24.04.2024</a:t>
+              <a:t>27.04.2024</a:t>
             </a:fld>
             <a:endParaRPr lang="en-TR"/>
           </a:p>
@@ -1167,7 +1167,7 @@
           <a:p>
             <a:fld id="{2F649C15-FD6D-3747-B6D3-EFDE118C1E97}" type="datetimeFigureOut">
               <a:rPr lang="en-TR" smtClean="0"/>
-              <a:t>24.04.2024</a:t>
+              <a:t>27.04.2024</a:t>
             </a:fld>
             <a:endParaRPr lang="en-TR"/>
           </a:p>
@@ -1435,7 +1435,7 @@
           <a:p>
             <a:fld id="{2F649C15-FD6D-3747-B6D3-EFDE118C1E97}" type="datetimeFigureOut">
               <a:rPr lang="en-TR" smtClean="0"/>
-              <a:t>24.04.2024</a:t>
+              <a:t>27.04.2024</a:t>
             </a:fld>
             <a:endParaRPr lang="en-TR"/>
           </a:p>
@@ -1850,7 +1850,7 @@
           <a:p>
             <a:fld id="{2F649C15-FD6D-3747-B6D3-EFDE118C1E97}" type="datetimeFigureOut">
               <a:rPr lang="en-TR" smtClean="0"/>
-              <a:t>24.04.2024</a:t>
+              <a:t>27.04.2024</a:t>
             </a:fld>
             <a:endParaRPr lang="en-TR"/>
           </a:p>
@@ -1992,7 +1992,7 @@
           <a:p>
             <a:fld id="{2F649C15-FD6D-3747-B6D3-EFDE118C1E97}" type="datetimeFigureOut">
               <a:rPr lang="en-TR" smtClean="0"/>
-              <a:t>24.04.2024</a:t>
+              <a:t>27.04.2024</a:t>
             </a:fld>
             <a:endParaRPr lang="en-TR"/>
           </a:p>
@@ -2105,7 +2105,7 @@
           <a:p>
             <a:fld id="{2F649C15-FD6D-3747-B6D3-EFDE118C1E97}" type="datetimeFigureOut">
               <a:rPr lang="en-TR" smtClean="0"/>
-              <a:t>24.04.2024</a:t>
+              <a:t>27.04.2024</a:t>
             </a:fld>
             <a:endParaRPr lang="en-TR"/>
           </a:p>
@@ -2418,7 +2418,7 @@
           <a:p>
             <a:fld id="{2F649C15-FD6D-3747-B6D3-EFDE118C1E97}" type="datetimeFigureOut">
               <a:rPr lang="en-TR" smtClean="0"/>
-              <a:t>24.04.2024</a:t>
+              <a:t>27.04.2024</a:t>
             </a:fld>
             <a:endParaRPr lang="en-TR"/>
           </a:p>
@@ -2707,7 +2707,7 @@
           <a:p>
             <a:fld id="{2F649C15-FD6D-3747-B6D3-EFDE118C1E97}" type="datetimeFigureOut">
               <a:rPr lang="en-TR" smtClean="0"/>
-              <a:t>24.04.2024</a:t>
+              <a:t>27.04.2024</a:t>
             </a:fld>
             <a:endParaRPr lang="en-TR"/>
           </a:p>
@@ -2950,7 +2950,7 @@
           <a:p>
             <a:fld id="{2F649C15-FD6D-3747-B6D3-EFDE118C1E97}" type="datetimeFigureOut">
               <a:rPr lang="en-TR" smtClean="0"/>
-              <a:t>24.04.2024</a:t>
+              <a:t>27.04.2024</a:t>
             </a:fld>
             <a:endParaRPr lang="en-TR"/>
           </a:p>

</xml_diff>